<commit_message>
Works, Last before implementing perfect
</commit_message>
<xml_diff>
--- a/Alethea11June2019.pptx
+++ b/Alethea11June2019.pptx
@@ -5,15 +5,20 @@
     <p:sldMasterId id="2147483780" r:id="rId1"/>
   </p:sldMasterIdLst>
   <p:notesMasterIdLst>
-    <p:notesMasterId r:id="rId5"/>
+    <p:notesMasterId r:id="rId10"/>
   </p:notesMasterIdLst>
   <p:handoutMasterIdLst>
-    <p:handoutMasterId r:id="rId6"/>
+    <p:handoutMasterId r:id="rId11"/>
   </p:handoutMasterIdLst>
   <p:sldIdLst>
     <p:sldId id="256" r:id="rId2"/>
     <p:sldId id="257" r:id="rId3"/>
     <p:sldId id="258" r:id="rId4"/>
+    <p:sldId id="259" r:id="rId5"/>
+    <p:sldId id="260" r:id="rId6"/>
+    <p:sldId id="261" r:id="rId7"/>
+    <p:sldId id="262" r:id="rId8"/>
+    <p:sldId id="263" r:id="rId9"/>
   </p:sldIdLst>
   <p:sldSz cx="12192000" cy="6858000"/>
   <p:notesSz cx="6858000" cy="9144000"/>
@@ -7089,16 +7094,12 @@
           <a:lstStyle/>
           <a:p>
             <a:r>
-              <a:rPr lang="en-US" sz="2400" smtClean="0"/>
+              <a:rPr lang="en-US" sz="2400" dirty="0" smtClean="0"/>
               <a:t>11</a:t>
             </a:r>
             <a:r>
-              <a:rPr lang="en-US" sz="2400" smtClean="0"/>
-              <a:t> </a:t>
-            </a:r>
-            <a:r>
               <a:rPr lang="en-US" sz="2400" dirty="0" smtClean="0"/>
-              <a:t>June 2019 Update</a:t>
+              <a:t> June 2019 Update</a:t>
             </a:r>
             <a:endParaRPr lang="en-US" sz="2400" dirty="0"/>
           </a:p>
@@ -7134,34 +7135,65 @@
           <a:chExt cx="0" cy="0"/>
         </a:xfrm>
       </p:grpSpPr>
-      <p:pic>
-        <p:nvPicPr>
-          <p:cNvPr id="2" name="Picture 1"/>
-          <p:cNvPicPr>
-            <a:picLocks noChangeAspect="1"/>
-          </p:cNvPicPr>
-          <p:nvPr/>
-        </p:nvPicPr>
-        <p:blipFill>
-          <a:blip r:embed="rId2"/>
-          <a:stretch>
-            <a:fillRect/>
-          </a:stretch>
-        </p:blipFill>
-        <p:spPr>
-          <a:xfrm>
-            <a:off x="3225800" y="1536700"/>
-            <a:ext cx="5740400" cy="3784600"/>
-          </a:xfrm>
-          <a:prstGeom prst="rect">
-            <a:avLst/>
-          </a:prstGeom>
-        </p:spPr>
-      </p:pic>
+      <p:sp>
+        <p:nvSpPr>
+          <p:cNvPr id="2" name="Title 1"/>
+          <p:cNvSpPr>
+            <a:spLocks noGrp="1"/>
+          </p:cNvSpPr>
+          <p:nvPr>
+            <p:ph type="title"/>
+          </p:nvPr>
+        </p:nvSpPr>
+        <p:spPr/>
+        <p:txBody>
+          <a:bodyPr/>
+          <a:lstStyle/>
+          <a:p>
+            <a:r>
+              <a:rPr lang="en-US" dirty="0" smtClean="0"/>
+              <a:t>The Story</a:t>
+            </a:r>
+            <a:endParaRPr lang="en-US" dirty="0"/>
+          </a:p>
+        </p:txBody>
+      </p:sp>
+      <p:sp>
+        <p:nvSpPr>
+          <p:cNvPr id="3" name="Content Placeholder 2"/>
+          <p:cNvSpPr>
+            <a:spLocks noGrp="1"/>
+          </p:cNvSpPr>
+          <p:nvPr>
+            <p:ph idx="1"/>
+          </p:nvPr>
+        </p:nvSpPr>
+        <p:spPr/>
+        <p:txBody>
+          <a:bodyPr/>
+          <a:lstStyle/>
+          <a:p>
+            <a:r>
+              <a:rPr lang="en-US" dirty="0" err="1" smtClean="0"/>
+              <a:t>Alethea</a:t>
+            </a:r>
+            <a:r>
+              <a:rPr lang="en-US" dirty="0" smtClean="0"/>
+              <a:t> is a police officer, tasked with stop and frisk duties.</a:t>
+            </a:r>
+          </a:p>
+          <a:p>
+            <a:r>
+              <a:rPr lang="en-US" dirty="0" smtClean="0"/>
+              <a:t>She wants to understand and quantify the social bias influencing her choices so she can augment her behavior to minimize bias.</a:t>
+            </a:r>
+          </a:p>
+        </p:txBody>
+      </p:sp>
     </p:spTree>
     <p:extLst>
       <p:ext uri="{BB962C8B-B14F-4D97-AF65-F5344CB8AC3E}">
-        <p14:creationId xmlns:p14="http://schemas.microsoft.com/office/powerpoint/2010/main" val="3603801712"/>
+        <p14:creationId xmlns:p14="http://schemas.microsoft.com/office/powerpoint/2010/main" val="1191691724"/>
       </p:ext>
     </p:extLst>
   </p:cSld>
@@ -7188,34 +7220,534 @@
           <a:chExt cx="0" cy="0"/>
         </a:xfrm>
       </p:grpSpPr>
-      <p:pic>
-        <p:nvPicPr>
-          <p:cNvPr id="2" name="Picture 1"/>
-          <p:cNvPicPr>
-            <a:picLocks noChangeAspect="1"/>
-          </p:cNvPicPr>
-          <p:nvPr/>
-        </p:nvPicPr>
-        <p:blipFill>
-          <a:blip r:embed="rId2"/>
-          <a:stretch>
-            <a:fillRect/>
-          </a:stretch>
-        </p:blipFill>
-        <p:spPr>
-          <a:xfrm>
-            <a:off x="0" y="1917700"/>
-            <a:ext cx="12192000" cy="3007629"/>
-          </a:xfrm>
-          <a:prstGeom prst="rect">
-            <a:avLst/>
-          </a:prstGeom>
-        </p:spPr>
-      </p:pic>
+      <p:sp>
+        <p:nvSpPr>
+          <p:cNvPr id="2" name="Title 1"/>
+          <p:cNvSpPr>
+            <a:spLocks noGrp="1"/>
+          </p:cNvSpPr>
+          <p:nvPr>
+            <p:ph type="title"/>
+          </p:nvPr>
+        </p:nvSpPr>
+        <p:spPr/>
+        <p:txBody>
+          <a:bodyPr/>
+          <a:lstStyle/>
+          <a:p>
+            <a:endParaRPr lang="en-US"/>
+          </a:p>
+        </p:txBody>
+      </p:sp>
+      <p:sp>
+        <p:nvSpPr>
+          <p:cNvPr id="3" name="Content Placeholder 2"/>
+          <p:cNvSpPr>
+            <a:spLocks noGrp="1"/>
+          </p:cNvSpPr>
+          <p:nvPr>
+            <p:ph idx="1"/>
+          </p:nvPr>
+        </p:nvSpPr>
+        <p:spPr/>
+        <p:txBody>
+          <a:bodyPr/>
+          <a:lstStyle/>
+          <a:p>
+            <a:r>
+              <a:rPr lang="en-US" dirty="0" smtClean="0"/>
+              <a:t>The model represents </a:t>
+            </a:r>
+            <a:r>
+              <a:rPr lang="en-US" dirty="0" err="1" smtClean="0"/>
+              <a:t>Alethea</a:t>
+            </a:r>
+            <a:r>
+              <a:rPr lang="en-US" dirty="0" smtClean="0"/>
+              <a:t>. At each step she is given a choice between two subjects and must decide whether to detain one or neither.</a:t>
+            </a:r>
+          </a:p>
+          <a:p>
+            <a:r>
+              <a:rPr lang="en-US" dirty="0" smtClean="0"/>
+              <a:t>The subjects have a level of criminality and a level of suspiciousness. Suspiciousness is a function of criminality with more suspicion tending to indicate more criminality.</a:t>
+            </a:r>
+            <a:endParaRPr lang="en-US" dirty="0"/>
+          </a:p>
+        </p:txBody>
+      </p:sp>
     </p:spTree>
     <p:extLst>
       <p:ext uri="{BB962C8B-B14F-4D97-AF65-F5344CB8AC3E}">
-        <p14:creationId xmlns:p14="http://schemas.microsoft.com/office/powerpoint/2010/main" val="2755453298"/>
+        <p14:creationId xmlns:p14="http://schemas.microsoft.com/office/powerpoint/2010/main" val="3449469542"/>
+      </p:ext>
+    </p:extLst>
+  </p:cSld>
+  <p:clrMapOvr>
+    <a:masterClrMapping/>
+  </p:clrMapOvr>
+</p:sld>
+</file>
+
+<file path=ppt/slides/slide4.xml><?xml version="1.0" encoding="utf-8"?>
+<p:sld xmlns:a="http://schemas.openxmlformats.org/drawingml/2006/main" xmlns:r="http://schemas.openxmlformats.org/officeDocument/2006/relationships" xmlns:p="http://schemas.openxmlformats.org/presentationml/2006/main">
+  <p:cSld>
+    <p:spTree>
+      <p:nvGrpSpPr>
+        <p:cNvPr id="1" name=""/>
+        <p:cNvGrpSpPr/>
+        <p:nvPr/>
+      </p:nvGrpSpPr>
+      <p:grpSpPr>
+        <a:xfrm>
+          <a:off x="0" y="0"/>
+          <a:ext cx="0" cy="0"/>
+          <a:chOff x="0" y="0"/>
+          <a:chExt cx="0" cy="0"/>
+        </a:xfrm>
+      </p:grpSpPr>
+      <p:sp>
+        <p:nvSpPr>
+          <p:cNvPr id="2" name="Title 1"/>
+          <p:cNvSpPr>
+            <a:spLocks noGrp="1"/>
+          </p:cNvSpPr>
+          <p:nvPr>
+            <p:ph type="title"/>
+          </p:nvPr>
+        </p:nvSpPr>
+        <p:spPr/>
+        <p:txBody>
+          <a:bodyPr/>
+          <a:lstStyle/>
+          <a:p>
+            <a:endParaRPr lang="en-US"/>
+          </a:p>
+        </p:txBody>
+      </p:sp>
+      <p:sp>
+        <p:nvSpPr>
+          <p:cNvPr id="3" name="Content Placeholder 2"/>
+          <p:cNvSpPr>
+            <a:spLocks noGrp="1"/>
+          </p:cNvSpPr>
+          <p:nvPr>
+            <p:ph idx="1"/>
+          </p:nvPr>
+        </p:nvSpPr>
+        <p:spPr/>
+        <p:txBody>
+          <a:bodyPr/>
+          <a:lstStyle/>
+          <a:p>
+            <a:r>
+              <a:rPr lang="en-US" dirty="0" err="1" smtClean="0"/>
+              <a:t>Alethea</a:t>
+            </a:r>
+            <a:r>
+              <a:rPr lang="en-US" dirty="0" smtClean="0"/>
+              <a:t> does not know the level of criminality of the subjects, only their suspiciousness level</a:t>
+            </a:r>
+          </a:p>
+          <a:p>
+            <a:r>
+              <a:rPr lang="en-US" dirty="0" smtClean="0"/>
+              <a:t>The subjects from one group have an added level of bias, </a:t>
+            </a:r>
+            <a:r>
+              <a:rPr lang="en-US" dirty="0" err="1" smtClean="0"/>
+              <a:t>Alethea</a:t>
+            </a:r>
+            <a:r>
+              <a:rPr lang="en-US" dirty="0" smtClean="0"/>
+              <a:t> unconsciously tends to overestimate their potential for criminality.</a:t>
+            </a:r>
+            <a:endParaRPr lang="en-US" dirty="0"/>
+          </a:p>
+        </p:txBody>
+      </p:sp>
+    </p:spTree>
+    <p:extLst>
+      <p:ext uri="{BB962C8B-B14F-4D97-AF65-F5344CB8AC3E}">
+        <p14:creationId xmlns:p14="http://schemas.microsoft.com/office/powerpoint/2010/main" val="737295302"/>
+      </p:ext>
+    </p:extLst>
+  </p:cSld>
+  <p:clrMapOvr>
+    <a:masterClrMapping/>
+  </p:clrMapOvr>
+</p:sld>
+</file>
+
+<file path=ppt/slides/slide5.xml><?xml version="1.0" encoding="utf-8"?>
+<p:sld xmlns:a="http://schemas.openxmlformats.org/drawingml/2006/main" xmlns:r="http://schemas.openxmlformats.org/officeDocument/2006/relationships" xmlns:p="http://schemas.openxmlformats.org/presentationml/2006/main">
+  <p:cSld>
+    <p:spTree>
+      <p:nvGrpSpPr>
+        <p:cNvPr id="1" name=""/>
+        <p:cNvGrpSpPr/>
+        <p:nvPr/>
+      </p:nvGrpSpPr>
+      <p:grpSpPr>
+        <a:xfrm>
+          <a:off x="0" y="0"/>
+          <a:ext cx="0" cy="0"/>
+          <a:chOff x="0" y="0"/>
+          <a:chExt cx="0" cy="0"/>
+        </a:xfrm>
+      </p:grpSpPr>
+      <p:sp>
+        <p:nvSpPr>
+          <p:cNvPr id="2" name="Title 1"/>
+          <p:cNvSpPr>
+            <a:spLocks noGrp="1"/>
+          </p:cNvSpPr>
+          <p:nvPr>
+            <p:ph type="title"/>
+          </p:nvPr>
+        </p:nvSpPr>
+        <p:spPr/>
+        <p:txBody>
+          <a:bodyPr/>
+          <a:lstStyle/>
+          <a:p>
+            <a:endParaRPr lang="en-US"/>
+          </a:p>
+        </p:txBody>
+      </p:sp>
+      <p:sp>
+        <p:nvSpPr>
+          <p:cNvPr id="3" name="Content Placeholder 2"/>
+          <p:cNvSpPr>
+            <a:spLocks noGrp="1"/>
+          </p:cNvSpPr>
+          <p:nvPr>
+            <p:ph idx="1"/>
+          </p:nvPr>
+        </p:nvSpPr>
+        <p:spPr/>
+        <p:txBody>
+          <a:bodyPr/>
+          <a:lstStyle/>
+          <a:p>
+            <a:r>
+              <a:rPr lang="en-US" dirty="0" smtClean="0"/>
+              <a:t>The reinforcement learning engine generates background data in three scenarios</a:t>
+            </a:r>
+          </a:p>
+          <a:p>
+            <a:r>
+              <a:rPr lang="en-US" dirty="0" smtClean="0"/>
+              <a:t>First, when </a:t>
+            </a:r>
+            <a:r>
+              <a:rPr lang="en-US" dirty="0" err="1" smtClean="0"/>
+              <a:t>Alethea</a:t>
+            </a:r>
+            <a:r>
+              <a:rPr lang="en-US" dirty="0" smtClean="0"/>
+              <a:t> has information on suspiciousness only</a:t>
+            </a:r>
+          </a:p>
+          <a:p>
+            <a:r>
+              <a:rPr lang="en-US" dirty="0" smtClean="0"/>
+              <a:t>Second when she knows suspiciousness and group</a:t>
+            </a:r>
+          </a:p>
+          <a:p>
+            <a:r>
+              <a:rPr lang="en-US" dirty="0" smtClean="0"/>
+              <a:t>Third, when she knows an indirect factor associated with group (like neighborhood)</a:t>
+            </a:r>
+          </a:p>
+          <a:p>
+            <a:endParaRPr lang="en-US" dirty="0"/>
+          </a:p>
+        </p:txBody>
+      </p:sp>
+    </p:spTree>
+    <p:extLst>
+      <p:ext uri="{BB962C8B-B14F-4D97-AF65-F5344CB8AC3E}">
+        <p14:creationId xmlns:p14="http://schemas.microsoft.com/office/powerpoint/2010/main" val="208957654"/>
+      </p:ext>
+    </p:extLst>
+  </p:cSld>
+  <p:clrMapOvr>
+    <a:masterClrMapping/>
+  </p:clrMapOvr>
+</p:sld>
+</file>
+
+<file path=ppt/slides/slide6.xml><?xml version="1.0" encoding="utf-8"?>
+<p:sld xmlns:a="http://schemas.openxmlformats.org/drawingml/2006/main" xmlns:r="http://schemas.openxmlformats.org/officeDocument/2006/relationships" xmlns:p="http://schemas.openxmlformats.org/presentationml/2006/main">
+  <p:cSld>
+    <p:spTree>
+      <p:nvGrpSpPr>
+        <p:cNvPr id="1" name=""/>
+        <p:cNvGrpSpPr/>
+        <p:nvPr/>
+      </p:nvGrpSpPr>
+      <p:grpSpPr>
+        <a:xfrm>
+          <a:off x="0" y="0"/>
+          <a:ext cx="0" cy="0"/>
+          <a:chOff x="0" y="0"/>
+          <a:chExt cx="0" cy="0"/>
+        </a:xfrm>
+      </p:grpSpPr>
+      <p:sp>
+        <p:nvSpPr>
+          <p:cNvPr id="2" name="Title 1"/>
+          <p:cNvSpPr>
+            <a:spLocks noGrp="1"/>
+          </p:cNvSpPr>
+          <p:nvPr>
+            <p:ph type="title"/>
+          </p:nvPr>
+        </p:nvSpPr>
+        <p:spPr/>
+        <p:txBody>
+          <a:bodyPr/>
+          <a:lstStyle/>
+          <a:p>
+            <a:endParaRPr lang="en-US"/>
+          </a:p>
+        </p:txBody>
+      </p:sp>
+      <p:sp>
+        <p:nvSpPr>
+          <p:cNvPr id="3" name="Content Placeholder 2"/>
+          <p:cNvSpPr>
+            <a:spLocks noGrp="1"/>
+          </p:cNvSpPr>
+          <p:nvPr>
+            <p:ph idx="1"/>
+          </p:nvPr>
+        </p:nvSpPr>
+        <p:spPr/>
+        <p:txBody>
+          <a:bodyPr/>
+          <a:lstStyle/>
+          <a:p>
+            <a:r>
+              <a:rPr lang="en-US" dirty="0" smtClean="0"/>
+              <a:t>A day is 32 time units in length</a:t>
+            </a:r>
+          </a:p>
+          <a:p>
+            <a:r>
+              <a:rPr lang="en-US" dirty="0" smtClean="0"/>
+              <a:t>Each stop and frisk incident takes for time units.</a:t>
+            </a:r>
+          </a:p>
+          <a:p>
+            <a:r>
+              <a:rPr lang="en-US" dirty="0" smtClean="0"/>
+              <a:t>The choice not to stop and frisk takes one time unit.</a:t>
+            </a:r>
+          </a:p>
+          <a:p>
+            <a:pPr marL="0" indent="0">
+              <a:buNone/>
+            </a:pPr>
+            <a:endParaRPr lang="en-US" dirty="0" smtClean="0"/>
+          </a:p>
+          <a:p>
+            <a:endParaRPr lang="en-US" dirty="0"/>
+          </a:p>
+        </p:txBody>
+      </p:sp>
+    </p:spTree>
+    <p:extLst>
+      <p:ext uri="{BB962C8B-B14F-4D97-AF65-F5344CB8AC3E}">
+        <p14:creationId xmlns:p14="http://schemas.microsoft.com/office/powerpoint/2010/main" val="223783145"/>
+      </p:ext>
+    </p:extLst>
+  </p:cSld>
+  <p:clrMapOvr>
+    <a:masterClrMapping/>
+  </p:clrMapOvr>
+</p:sld>
+</file>
+
+<file path=ppt/slides/slide7.xml><?xml version="1.0" encoding="utf-8"?>
+<p:sld xmlns:a="http://schemas.openxmlformats.org/drawingml/2006/main" xmlns:r="http://schemas.openxmlformats.org/officeDocument/2006/relationships" xmlns:p="http://schemas.openxmlformats.org/presentationml/2006/main">
+  <p:cSld>
+    <p:spTree>
+      <p:nvGrpSpPr>
+        <p:cNvPr id="1" name=""/>
+        <p:cNvGrpSpPr/>
+        <p:nvPr/>
+      </p:nvGrpSpPr>
+      <p:grpSpPr>
+        <a:xfrm>
+          <a:off x="0" y="0"/>
+          <a:ext cx="0" cy="0"/>
+          <a:chOff x="0" y="0"/>
+          <a:chExt cx="0" cy="0"/>
+        </a:xfrm>
+      </p:grpSpPr>
+      <p:sp>
+        <p:nvSpPr>
+          <p:cNvPr id="2" name="Title 1"/>
+          <p:cNvSpPr>
+            <a:spLocks noGrp="1"/>
+          </p:cNvSpPr>
+          <p:nvPr>
+            <p:ph type="title"/>
+          </p:nvPr>
+        </p:nvSpPr>
+        <p:spPr/>
+        <p:txBody>
+          <a:bodyPr/>
+          <a:lstStyle/>
+          <a:p>
+            <a:endParaRPr lang="en-US"/>
+          </a:p>
+        </p:txBody>
+      </p:sp>
+      <p:sp>
+        <p:nvSpPr>
+          <p:cNvPr id="3" name="Content Placeholder 2"/>
+          <p:cNvSpPr>
+            <a:spLocks noGrp="1"/>
+          </p:cNvSpPr>
+          <p:nvPr>
+            <p:ph idx="1"/>
+          </p:nvPr>
+        </p:nvSpPr>
+        <p:spPr/>
+        <p:txBody>
+          <a:bodyPr/>
+          <a:lstStyle/>
+          <a:p>
+            <a:r>
+              <a:rPr lang="en-US" dirty="0" smtClean="0"/>
+              <a:t>Criminality is ranked 1 to 4 with 4 being more criminal</a:t>
+            </a:r>
+          </a:p>
+          <a:p>
+            <a:r>
+              <a:rPr lang="en-US" dirty="0" smtClean="0"/>
+              <a:t>Suspiciousness for the non target group is </a:t>
+            </a:r>
+            <a:r>
+              <a:rPr lang="en-US" dirty="0" err="1" smtClean="0"/>
+              <a:t>criminality+random</a:t>
+            </a:r>
+            <a:r>
+              <a:rPr lang="en-US" dirty="0" smtClean="0"/>
+              <a:t> (0,1)</a:t>
+            </a:r>
+          </a:p>
+          <a:p>
+            <a:r>
+              <a:rPr lang="en-US" dirty="0"/>
+              <a:t>Suspiciousness for </a:t>
+            </a:r>
+            <a:r>
+              <a:rPr lang="en-US" dirty="0" smtClean="0"/>
+              <a:t>the </a:t>
+            </a:r>
+            <a:r>
+              <a:rPr lang="en-US" dirty="0"/>
+              <a:t>target group is </a:t>
+            </a:r>
+            <a:r>
+              <a:rPr lang="en-US" dirty="0" err="1"/>
+              <a:t>criminality+random</a:t>
+            </a:r>
+            <a:r>
+              <a:rPr lang="en-US" dirty="0"/>
+              <a:t> </a:t>
+            </a:r>
+            <a:r>
+              <a:rPr lang="en-US" dirty="0" smtClean="0"/>
+              <a:t>(1,1</a:t>
+            </a:r>
+            <a:r>
+              <a:rPr lang="en-US" dirty="0"/>
+              <a:t>)</a:t>
+            </a:r>
+          </a:p>
+          <a:p>
+            <a:endParaRPr lang="en-US" dirty="0"/>
+          </a:p>
+        </p:txBody>
+      </p:sp>
+    </p:spTree>
+    <p:extLst>
+      <p:ext uri="{BB962C8B-B14F-4D97-AF65-F5344CB8AC3E}">
+        <p14:creationId xmlns:p14="http://schemas.microsoft.com/office/powerpoint/2010/main" val="3680681668"/>
+      </p:ext>
+    </p:extLst>
+  </p:cSld>
+  <p:clrMapOvr>
+    <a:masterClrMapping/>
+  </p:clrMapOvr>
+</p:sld>
+</file>
+
+<file path=ppt/slides/slide8.xml><?xml version="1.0" encoding="utf-8"?>
+<p:sld xmlns:a="http://schemas.openxmlformats.org/drawingml/2006/main" xmlns:r="http://schemas.openxmlformats.org/officeDocument/2006/relationships" xmlns:p="http://schemas.openxmlformats.org/presentationml/2006/main">
+  <p:cSld>
+    <p:spTree>
+      <p:nvGrpSpPr>
+        <p:cNvPr id="1" name=""/>
+        <p:cNvGrpSpPr/>
+        <p:nvPr/>
+      </p:nvGrpSpPr>
+      <p:grpSpPr>
+        <a:xfrm>
+          <a:off x="0" y="0"/>
+          <a:ext cx="0" cy="0"/>
+          <a:chOff x="0" y="0"/>
+          <a:chExt cx="0" cy="0"/>
+        </a:xfrm>
+      </p:grpSpPr>
+      <p:sp>
+        <p:nvSpPr>
+          <p:cNvPr id="2" name="Title 1"/>
+          <p:cNvSpPr>
+            <a:spLocks noGrp="1"/>
+          </p:cNvSpPr>
+          <p:nvPr>
+            <p:ph type="title"/>
+          </p:nvPr>
+        </p:nvSpPr>
+        <p:spPr/>
+        <p:txBody>
+          <a:bodyPr/>
+          <a:lstStyle/>
+          <a:p>
+            <a:endParaRPr lang="en-US"/>
+          </a:p>
+        </p:txBody>
+      </p:sp>
+      <p:sp>
+        <p:nvSpPr>
+          <p:cNvPr id="3" name="Content Placeholder 2"/>
+          <p:cNvSpPr>
+            <a:spLocks noGrp="1"/>
+          </p:cNvSpPr>
+          <p:nvPr>
+            <p:ph idx="1"/>
+          </p:nvPr>
+        </p:nvSpPr>
+        <p:spPr/>
+        <p:txBody>
+          <a:bodyPr/>
+          <a:lstStyle/>
+          <a:p>
+            <a:endParaRPr lang="en-US"/>
+          </a:p>
+        </p:txBody>
+      </p:sp>
+    </p:spTree>
+    <p:extLst>
+      <p:ext uri="{BB962C8B-B14F-4D97-AF65-F5344CB8AC3E}">
+        <p14:creationId xmlns:p14="http://schemas.microsoft.com/office/powerpoint/2010/main" val="3023268847"/>
       </p:ext>
     </p:extLst>
   </p:cSld>

</xml_diff>